<commit_message>
Update Project Presentation Slides.pptx
added objectives slide
</commit_message>
<xml_diff>
--- a/Project Presentation Slides.pptx
+++ b/Project Presentation Slides.pptx
@@ -12,8 +12,8 @@
   </p:handoutMasterIdLst>
   <p:sldIdLst>
     <p:sldId id="325" r:id="rId5"/>
-    <p:sldId id="259" r:id="rId6"/>
-    <p:sldId id="326" r:id="rId7"/>
+    <p:sldId id="326" r:id="rId6"/>
+    <p:sldId id="259" r:id="rId7"/>
     <p:sldId id="257" r:id="rId8"/>
     <p:sldId id="261" r:id="rId9"/>
     <p:sldId id="258" r:id="rId10"/>
@@ -9387,136 +9387,6 @@
       </p:grpSpPr>
       <p:sp>
         <p:nvSpPr>
-          <p:cNvPr id="3" name="Subtitle 2">
-            <a:extLst>
-              <a:ext uri="{FF2B5EF4-FFF2-40B4-BE49-F238E27FC236}">
-                <a16:creationId xmlns:a16="http://schemas.microsoft.com/office/drawing/2014/main" id="{72446868-83F0-CEEF-5E60-6D55C93B523F}"/>
-              </a:ext>
-            </a:extLst>
-          </p:cNvPr>
-          <p:cNvSpPr>
-            <a:spLocks noGrp="1"/>
-          </p:cNvSpPr>
-          <p:nvPr>
-            <p:ph type="subTitle" idx="1"/>
-          </p:nvPr>
-        </p:nvSpPr>
-        <p:spPr>
-          <a:xfrm>
-            <a:off x="841248" y="6044184"/>
-            <a:ext cx="10515600" cy="457200"/>
-          </a:xfrm>
-          <a:noFill/>
-        </p:spPr>
-        <p:txBody>
-          <a:bodyPr>
-            <a:normAutofit/>
-          </a:bodyPr>
-          <a:lstStyle/>
-          <a:p>
-            <a:r>
-              <a:rPr lang="en-US" dirty="0"/>
-              <a:t>Aiming to revolutionize industries through our forward-thinking solutions</a:t>
-            </a:r>
-          </a:p>
-        </p:txBody>
-      </p:sp>
-      <p:pic>
-        <p:nvPicPr>
-          <p:cNvPr id="10" name="Picture Placeholder 9" descr="Stethoscope on white background">
-            <a:extLst>
-              <a:ext uri="{FF2B5EF4-FFF2-40B4-BE49-F238E27FC236}">
-                <a16:creationId xmlns:a16="http://schemas.microsoft.com/office/drawing/2014/main" id="{99058E17-80B3-F3F9-AF6A-0518C39D940F}"/>
-              </a:ext>
-            </a:extLst>
-          </p:cNvPr>
-          <p:cNvPicPr>
-            <a:picLocks noGrp="1" noChangeAspect="1"/>
-          </p:cNvPicPr>
-          <p:nvPr>
-            <p:ph type="pic" sz="quarter" idx="13"/>
-          </p:nvPr>
-        </p:nvPicPr>
-        <p:blipFill>
-          <a:blip r:embed="rId2"/>
-          <a:srcRect t="7511" b="63143"/>
-          <a:stretch/>
-        </p:blipFill>
-        <p:spPr>
-          <a:xfrm>
-            <a:off x="3048" y="-173833"/>
-            <a:ext cx="12188952" cy="1911927"/>
-          </a:xfrm>
-        </p:spPr>
-      </p:pic>
-      <p:sp>
-        <p:nvSpPr>
-          <p:cNvPr id="2" name="Title 1">
-            <a:extLst>
-              <a:ext uri="{FF2B5EF4-FFF2-40B4-BE49-F238E27FC236}">
-                <a16:creationId xmlns:a16="http://schemas.microsoft.com/office/drawing/2014/main" id="{954ABE40-AA00-F366-A36A-B3F1AADBF025}"/>
-              </a:ext>
-            </a:extLst>
-          </p:cNvPr>
-          <p:cNvSpPr>
-            <a:spLocks noGrp="1"/>
-          </p:cNvSpPr>
-          <p:nvPr>
-            <p:ph type="ctrTitle"/>
-          </p:nvPr>
-        </p:nvSpPr>
-        <p:spPr>
-          <a:xfrm>
-            <a:off x="841248" y="-237777"/>
-            <a:ext cx="10515600" cy="1564263"/>
-          </a:xfrm>
-          <a:noFill/>
-        </p:spPr>
-        <p:txBody>
-          <a:bodyPr anchor="ctr" anchorCtr="0">
-            <a:noAutofit/>
-          </a:bodyPr>
-          <a:lstStyle/>
-          <a:p>
-            <a:r>
-              <a:rPr lang="en-US" sz="4800" dirty="0"/>
-              <a:t>Objectives</a:t>
-            </a:r>
-          </a:p>
-        </p:txBody>
-      </p:sp>
-    </p:spTree>
-    <p:extLst>
-      <p:ext uri="{BB962C8B-B14F-4D97-AF65-F5344CB8AC3E}">
-        <p14:creationId xmlns:p14="http://schemas.microsoft.com/office/powerpoint/2010/main" val="1008037533"/>
-      </p:ext>
-    </p:extLst>
-  </p:cSld>
-  <p:clrMapOvr>
-    <a:masterClrMapping/>
-  </p:clrMapOvr>
-</p:sld>
-</file>
-
-<file path=ppt/slides/slide3.xml><?xml version="1.0" encoding="utf-8"?>
-<p:sld xmlns:a="http://schemas.openxmlformats.org/drawingml/2006/main" xmlns:r="http://schemas.openxmlformats.org/officeDocument/2006/relationships" xmlns:p="http://schemas.openxmlformats.org/presentationml/2006/main">
-  <p:cSld>
-    <p:spTree>
-      <p:nvGrpSpPr>
-        <p:cNvPr id="1" name=""/>
-        <p:cNvGrpSpPr/>
-        <p:nvPr/>
-      </p:nvGrpSpPr>
-      <p:grpSpPr>
-        <a:xfrm>
-          <a:off x="0" y="0"/>
-          <a:ext cx="0" cy="0"/>
-          <a:chOff x="0" y="0"/>
-          <a:chExt cx="0" cy="0"/>
-        </a:xfrm>
-      </p:grpSpPr>
-      <p:sp>
-        <p:nvSpPr>
           <p:cNvPr id="2" name="Title 1">
             <a:extLst>
               <a:ext uri="{FF2B5EF4-FFF2-40B4-BE49-F238E27FC236}">
@@ -17652,6 +17522,383 @@
                                         </p:cTn>
                                         <p:tgtEl>
                                           <p:spTgt spid="19"/>
+                                        </p:tgtEl>
+                                        <p:attrNameLst>
+                                          <p:attrName>style.visibility</p:attrName>
+                                        </p:attrNameLst>
+                                      </p:cBhvr>
+                                      <p:to>
+                                        <p:strVal val="visible"/>
+                                      </p:to>
+                                    </p:set>
+                                  </p:childTnLst>
+                                </p:cTn>
+                              </p:par>
+                            </p:childTnLst>
+                          </p:cTn>
+                        </p:par>
+                      </p:childTnLst>
+                    </p:cTn>
+                  </p:par>
+                </p:childTnLst>
+              </p:cTn>
+              <p:prevCondLst>
+                <p:cond evt="onPrev" delay="0">
+                  <p:tgtEl>
+                    <p:sldTgt/>
+                  </p:tgtEl>
+                </p:cond>
+              </p:prevCondLst>
+              <p:nextCondLst>
+                <p:cond evt="onNext" delay="0">
+                  <p:tgtEl>
+                    <p:sldTgt/>
+                  </p:tgtEl>
+                </p:cond>
+              </p:nextCondLst>
+            </p:seq>
+          </p:childTnLst>
+        </p:cTn>
+      </p:par>
+    </p:tnLst>
+  </p:timing>
+</p:sld>
+</file>
+
+<file path=ppt/slides/slide3.xml><?xml version="1.0" encoding="utf-8"?>
+<p:sld xmlns:a="http://schemas.openxmlformats.org/drawingml/2006/main" xmlns:r="http://schemas.openxmlformats.org/officeDocument/2006/relationships" xmlns:p="http://schemas.openxmlformats.org/presentationml/2006/main">
+  <p:cSld>
+    <p:spTree>
+      <p:nvGrpSpPr>
+        <p:cNvPr id="1" name=""/>
+        <p:cNvGrpSpPr/>
+        <p:nvPr/>
+      </p:nvGrpSpPr>
+      <p:grpSpPr>
+        <a:xfrm>
+          <a:off x="0" y="0"/>
+          <a:ext cx="0" cy="0"/>
+          <a:chOff x="0" y="0"/>
+          <a:chExt cx="0" cy="0"/>
+        </a:xfrm>
+      </p:grpSpPr>
+      <p:pic>
+        <p:nvPicPr>
+          <p:cNvPr id="10" name="Picture Placeholder 9" descr="Stethoscope on white background">
+            <a:extLst>
+              <a:ext uri="{FF2B5EF4-FFF2-40B4-BE49-F238E27FC236}">
+                <a16:creationId xmlns:a16="http://schemas.microsoft.com/office/drawing/2014/main" id="{99058E17-80B3-F3F9-AF6A-0518C39D940F}"/>
+              </a:ext>
+            </a:extLst>
+          </p:cNvPr>
+          <p:cNvPicPr>
+            <a:picLocks noGrp="1" noChangeAspect="1"/>
+          </p:cNvPicPr>
+          <p:nvPr>
+            <p:ph type="pic" sz="quarter" idx="13"/>
+          </p:nvPr>
+        </p:nvPicPr>
+        <p:blipFill>
+          <a:blip r:embed="rId2"/>
+          <a:srcRect t="7511" b="63143"/>
+          <a:stretch/>
+        </p:blipFill>
+        <p:spPr>
+          <a:xfrm>
+            <a:off x="3048" y="-173833"/>
+            <a:ext cx="12188952" cy="1911927"/>
+          </a:xfrm>
+        </p:spPr>
+      </p:pic>
+      <p:sp>
+        <p:nvSpPr>
+          <p:cNvPr id="2" name="Title 1">
+            <a:extLst>
+              <a:ext uri="{FF2B5EF4-FFF2-40B4-BE49-F238E27FC236}">
+                <a16:creationId xmlns:a16="http://schemas.microsoft.com/office/drawing/2014/main" id="{954ABE40-AA00-F366-A36A-B3F1AADBF025}"/>
+              </a:ext>
+            </a:extLst>
+          </p:cNvPr>
+          <p:cNvSpPr>
+            <a:spLocks noGrp="1"/>
+          </p:cNvSpPr>
+          <p:nvPr>
+            <p:ph type="ctrTitle"/>
+          </p:nvPr>
+        </p:nvSpPr>
+        <p:spPr>
+          <a:xfrm>
+            <a:off x="841248" y="-237777"/>
+            <a:ext cx="10515600" cy="1564263"/>
+          </a:xfrm>
+          <a:noFill/>
+        </p:spPr>
+        <p:txBody>
+          <a:bodyPr anchor="ctr" anchorCtr="0">
+            <a:noAutofit/>
+          </a:bodyPr>
+          <a:lstStyle/>
+          <a:p>
+            <a:r>
+              <a:rPr lang="en-US" sz="4800" dirty="0"/>
+              <a:t>Objectives</a:t>
+            </a:r>
+          </a:p>
+        </p:txBody>
+      </p:sp>
+      <p:sp>
+        <p:nvSpPr>
+          <p:cNvPr id="7" name="TextBox 6">
+            <a:extLst>
+              <a:ext uri="{FF2B5EF4-FFF2-40B4-BE49-F238E27FC236}">
+                <a16:creationId xmlns:a16="http://schemas.microsoft.com/office/drawing/2014/main" id="{1DE850F8-1B2E-F243-510D-F064176ED3FD}"/>
+              </a:ext>
+            </a:extLst>
+          </p:cNvPr>
+          <p:cNvSpPr txBox="1"/>
+          <p:nvPr/>
+        </p:nvSpPr>
+        <p:spPr>
+          <a:xfrm>
+            <a:off x="598943" y="1854379"/>
+            <a:ext cx="10994113" cy="3847207"/>
+          </a:xfrm>
+          <a:prstGeom prst="rect">
+            <a:avLst/>
+          </a:prstGeom>
+          <a:noFill/>
+        </p:spPr>
+        <p:txBody>
+          <a:bodyPr wrap="square" rtlCol="0">
+            <a:spAutoFit/>
+          </a:bodyPr>
+          <a:lstStyle/>
+          <a:p>
+            <a:pPr algn="ctr"/>
+            <a:r>
+              <a:rPr lang="en-US" sz="4800" u="sng" dirty="0"/>
+              <a:t>Two main objectives</a:t>
+            </a:r>
+          </a:p>
+          <a:p>
+            <a:pPr algn="ctr"/>
+            <a:r>
+              <a:rPr lang="en-US" sz="1600" u="sng" dirty="0"/>
+              <a:t> </a:t>
+            </a:r>
+          </a:p>
+          <a:p>
+            <a:pPr marL="742950" indent="-742950">
+              <a:buAutoNum type="arabicPeriod"/>
+            </a:pPr>
+            <a:r>
+              <a:rPr lang="en-US" sz="3600" dirty="0"/>
+              <a:t>Is </a:t>
+            </a:r>
+            <a:r>
+              <a:rPr lang="en-US" sz="3600" b="1" dirty="0"/>
+              <a:t>infection risk</a:t>
+            </a:r>
+            <a:r>
+              <a:rPr lang="en-US" sz="3600" dirty="0"/>
+              <a:t> and related factors associated with a patient’s length of stay after accounting for other variables?</a:t>
+            </a:r>
+          </a:p>
+          <a:p>
+            <a:pPr marL="742950" indent="-742950">
+              <a:buAutoNum type="arabicPeriod"/>
+            </a:pPr>
+            <a:endParaRPr lang="en-US" sz="3600" dirty="0"/>
+          </a:p>
+          <a:p>
+            <a:pPr marL="742950" indent="-742950">
+              <a:buAutoNum type="arabicPeriod"/>
+            </a:pPr>
+            <a:r>
+              <a:rPr lang="en-US" sz="3600" dirty="0"/>
+              <a:t>Fit multiple models to predict future patients’ hospital stays and compare the models to one another.</a:t>
+            </a:r>
+          </a:p>
+        </p:txBody>
+      </p:sp>
+    </p:spTree>
+    <p:extLst>
+      <p:ext uri="{BB962C8B-B14F-4D97-AF65-F5344CB8AC3E}">
+        <p14:creationId xmlns:p14="http://schemas.microsoft.com/office/powerpoint/2010/main" val="1008037533"/>
+      </p:ext>
+    </p:extLst>
+  </p:cSld>
+  <p:clrMapOvr>
+    <a:masterClrMapping/>
+  </p:clrMapOvr>
+  <p:timing>
+    <p:tnLst>
+      <p:par>
+        <p:cTn id="1" dur="indefinite" restart="never" nodeType="tmRoot">
+          <p:childTnLst>
+            <p:seq concurrent="1" nextAc="seek">
+              <p:cTn id="2" dur="indefinite" nodeType="mainSeq">
+                <p:childTnLst>
+                  <p:par>
+                    <p:cTn id="3" fill="hold">
+                      <p:stCondLst>
+                        <p:cond delay="indefinite"/>
+                      </p:stCondLst>
+                      <p:childTnLst>
+                        <p:par>
+                          <p:cTn id="4" fill="hold">
+                            <p:stCondLst>
+                              <p:cond delay="0"/>
+                            </p:stCondLst>
+                            <p:childTnLst>
+                              <p:par>
+                                <p:cTn id="5" presetID="1" presetClass="entr" presetSubtype="0" fill="hold" nodeType="clickEffect">
+                                  <p:stCondLst>
+                                    <p:cond delay="0"/>
+                                  </p:stCondLst>
+                                  <p:childTnLst>
+                                    <p:set>
+                                      <p:cBhvr>
+                                        <p:cTn id="6" dur="1" fill="hold">
+                                          <p:stCondLst>
+                                            <p:cond delay="0"/>
+                                          </p:stCondLst>
+                                        </p:cTn>
+                                        <p:tgtEl>
+                                          <p:spTgt spid="7">
+                                            <p:txEl>
+                                              <p:pRg st="0" end="0"/>
+                                            </p:txEl>
+                                          </p:spTgt>
+                                        </p:tgtEl>
+                                        <p:attrNameLst>
+                                          <p:attrName>style.visibility</p:attrName>
+                                        </p:attrNameLst>
+                                      </p:cBhvr>
+                                      <p:to>
+                                        <p:strVal val="visible"/>
+                                      </p:to>
+                                    </p:set>
+                                  </p:childTnLst>
+                                </p:cTn>
+                              </p:par>
+                              <p:par>
+                                <p:cTn id="7" presetID="1" presetClass="entr" presetSubtype="0" fill="hold" nodeType="withEffect">
+                                  <p:stCondLst>
+                                    <p:cond delay="0"/>
+                                  </p:stCondLst>
+                                  <p:childTnLst>
+                                    <p:set>
+                                      <p:cBhvr>
+                                        <p:cTn id="8" dur="1" fill="hold">
+                                          <p:stCondLst>
+                                            <p:cond delay="0"/>
+                                          </p:stCondLst>
+                                        </p:cTn>
+                                        <p:tgtEl>
+                                          <p:spTgt spid="7">
+                                            <p:txEl>
+                                              <p:pRg st="1" end="1"/>
+                                            </p:txEl>
+                                          </p:spTgt>
+                                        </p:tgtEl>
+                                        <p:attrNameLst>
+                                          <p:attrName>style.visibility</p:attrName>
+                                        </p:attrNameLst>
+                                      </p:cBhvr>
+                                      <p:to>
+                                        <p:strVal val="visible"/>
+                                      </p:to>
+                                    </p:set>
+                                  </p:childTnLst>
+                                </p:cTn>
+                              </p:par>
+                            </p:childTnLst>
+                          </p:cTn>
+                        </p:par>
+                      </p:childTnLst>
+                    </p:cTn>
+                  </p:par>
+                  <p:par>
+                    <p:cTn id="9" fill="hold">
+                      <p:stCondLst>
+                        <p:cond delay="indefinite"/>
+                      </p:stCondLst>
+                      <p:childTnLst>
+                        <p:par>
+                          <p:cTn id="10" fill="hold">
+                            <p:stCondLst>
+                              <p:cond delay="0"/>
+                            </p:stCondLst>
+                            <p:childTnLst>
+                              <p:par>
+                                <p:cTn id="11" presetID="1" presetClass="entr" presetSubtype="0" fill="hold" nodeType="clickEffect">
+                                  <p:stCondLst>
+                                    <p:cond delay="0"/>
+                                  </p:stCondLst>
+                                  <p:childTnLst>
+                                    <p:set>
+                                      <p:cBhvr>
+                                        <p:cTn id="12" dur="1" fill="hold">
+                                          <p:stCondLst>
+                                            <p:cond delay="0"/>
+                                          </p:stCondLst>
+                                        </p:cTn>
+                                        <p:tgtEl>
+                                          <p:spTgt spid="7">
+                                            <p:txEl>
+                                              <p:pRg st="2" end="2"/>
+                                            </p:txEl>
+                                          </p:spTgt>
+                                        </p:tgtEl>
+                                        <p:attrNameLst>
+                                          <p:attrName>style.visibility</p:attrName>
+                                        </p:attrNameLst>
+                                      </p:cBhvr>
+                                      <p:to>
+                                        <p:strVal val="visible"/>
+                                      </p:to>
+                                    </p:set>
+                                  </p:childTnLst>
+                                </p:cTn>
+                              </p:par>
+                            </p:childTnLst>
+                          </p:cTn>
+                        </p:par>
+                      </p:childTnLst>
+                    </p:cTn>
+                  </p:par>
+                  <p:par>
+                    <p:cTn id="13" fill="hold">
+                      <p:stCondLst>
+                        <p:cond delay="indefinite"/>
+                      </p:stCondLst>
+                      <p:childTnLst>
+                        <p:par>
+                          <p:cTn id="14" fill="hold">
+                            <p:stCondLst>
+                              <p:cond delay="0"/>
+                            </p:stCondLst>
+                            <p:childTnLst>
+                              <p:par>
+                                <p:cTn id="15" presetID="1" presetClass="entr" presetSubtype="0" fill="hold" nodeType="clickEffect">
+                                  <p:stCondLst>
+                                    <p:cond delay="0"/>
+                                  </p:stCondLst>
+                                  <p:childTnLst>
+                                    <p:set>
+                                      <p:cBhvr>
+                                        <p:cTn id="16" dur="1" fill="hold">
+                                          <p:stCondLst>
+                                            <p:cond delay="0"/>
+                                          </p:stCondLst>
+                                        </p:cTn>
+                                        <p:tgtEl>
+                                          <p:spTgt spid="7">
+                                            <p:txEl>
+                                              <p:pRg st="4" end="4"/>
+                                            </p:txEl>
+                                          </p:spTgt>
                                         </p:tgtEl>
                                         <p:attrNameLst>
                                           <p:attrName>style.visibility</p:attrName>

</xml_diff>